<commit_message>
modify recommender.py and update powerpoint
</commit_message>
<xml_diff>
--- a/summary_presentation.pptx
+++ b/summary_presentation.pptx
@@ -11,6 +11,9 @@
     <p:sldId id="259" r:id="rId5"/>
     <p:sldId id="260" r:id="rId6"/>
     <p:sldId id="261" r:id="rId7"/>
+    <p:sldId id="262" r:id="rId8"/>
+    <p:sldId id="264" r:id="rId9"/>
+    <p:sldId id="263" r:id="rId10"/>
   </p:sldIdLst>
   <p:sldSz cx="12192000" cy="6858000"/>
   <p:notesSz cx="6858000" cy="9144000"/>
@@ -8792,7 +8795,7 @@
                                           </p:stCondLst>
                                         </p:cTn>
                                         <p:tgtEl>
-                                          <p:spTgt spid="22"/>
+                                          <p:spTgt spid="25"/>
                                         </p:tgtEl>
                                         <p:attrNameLst>
                                           <p:attrName>style.visibility</p:attrName>
@@ -8819,6 +8822,51 @@
                                           </p:stCondLst>
                                         </p:cTn>
                                         <p:tgtEl>
+                                          <p:spTgt spid="22"/>
+                                        </p:tgtEl>
+                                        <p:attrNameLst>
+                                          <p:attrName>style.visibility</p:attrName>
+                                        </p:attrNameLst>
+                                      </p:cBhvr>
+                                      <p:to>
+                                        <p:strVal val="visible"/>
+                                      </p:to>
+                                    </p:set>
+                                  </p:childTnLst>
+                                </p:cTn>
+                              </p:par>
+                            </p:childTnLst>
+                          </p:cTn>
+                        </p:par>
+                      </p:childTnLst>
+                    </p:cTn>
+                  </p:par>
+                  <p:par>
+                    <p:cTn id="19" fill="hold">
+                      <p:stCondLst>
+                        <p:cond delay="indefinite"/>
+                      </p:stCondLst>
+                      <p:childTnLst>
+                        <p:par>
+                          <p:cTn id="20" fill="hold">
+                            <p:stCondLst>
+                              <p:cond delay="0"/>
+                            </p:stCondLst>
+                            <p:childTnLst>
+                              <p:par>
+                                <p:cTn id="21" presetID="1" presetClass="entr" presetSubtype="0" fill="hold" grpId="0" nodeType="clickEffect">
+                                  <p:stCondLst>
+                                    <p:cond delay="0"/>
+                                  </p:stCondLst>
+                                  <p:childTnLst>
+                                    <p:set>
+                                      <p:cBhvr>
+                                        <p:cTn id="22" dur="1" fill="hold">
+                                          <p:stCondLst>
+                                            <p:cond delay="0"/>
+                                          </p:stCondLst>
+                                        </p:cTn>
+                                        <p:tgtEl>
                                           <p:spTgt spid="26"/>
                                         </p:tgtEl>
                                         <p:attrNameLst>
@@ -8833,14 +8881,14 @@
                                 </p:cTn>
                               </p:par>
                               <p:par>
-                                <p:cTn id="19" presetID="1" presetClass="entr" presetSubtype="0" fill="hold" nodeType="withEffect">
+                                <p:cTn id="23" presetID="1" presetClass="entr" presetSubtype="0" fill="hold" nodeType="withEffect">
                                   <p:stCondLst>
                                     <p:cond delay="0"/>
                                   </p:stCondLst>
                                   <p:childTnLst>
                                     <p:set>
                                       <p:cBhvr>
-                                        <p:cTn id="20" dur="1" fill="hold">
+                                        <p:cTn id="24" dur="1" fill="hold">
                                           <p:stCondLst>
                                             <p:cond delay="0"/>
                                           </p:stCondLst>
@@ -8866,26 +8914,26 @@
                     </p:cTn>
                   </p:par>
                   <p:par>
-                    <p:cTn id="21" fill="hold">
+                    <p:cTn id="25" fill="hold">
                       <p:stCondLst>
                         <p:cond delay="indefinite"/>
                       </p:stCondLst>
                       <p:childTnLst>
                         <p:par>
-                          <p:cTn id="22" fill="hold">
+                          <p:cTn id="26" fill="hold">
                             <p:stCondLst>
                               <p:cond delay="0"/>
                             </p:stCondLst>
                             <p:childTnLst>
                               <p:par>
-                                <p:cTn id="23" presetID="3" presetClass="entr" presetSubtype="10" fill="hold" grpId="0" nodeType="clickEffect">
+                                <p:cTn id="27" presetID="9" presetClass="entr" presetSubtype="0" fill="hold" grpId="0" nodeType="clickEffect">
                                   <p:stCondLst>
                                     <p:cond delay="0"/>
                                   </p:stCondLst>
                                   <p:childTnLst>
                                     <p:set>
                                       <p:cBhvr>
-                                        <p:cTn id="24" dur="1" fill="hold">
+                                        <p:cTn id="28" dur="1" fill="hold">
                                           <p:stCondLst>
                                             <p:cond delay="0"/>
                                           </p:stCondLst>
@@ -8901,9 +8949,9 @@
                                         <p:strVal val="visible"/>
                                       </p:to>
                                     </p:set>
-                                    <p:animEffect transition="in" filter="blinds(horizontal)">
+                                    <p:animEffect transition="in" filter="dissolve">
                                       <p:cBhvr>
-                                        <p:cTn id="25" dur="500"/>
+                                        <p:cTn id="29" dur="500"/>
                                         <p:tgtEl>
                                           <p:spTgt spid="31"/>
                                         </p:tgtEl>
@@ -8913,14 +8961,14 @@
                                 </p:cTn>
                               </p:par>
                               <p:par>
-                                <p:cTn id="26" presetID="9" presetClass="entr" presetSubtype="0" fill="hold" nodeType="withEffect">
+                                <p:cTn id="30" presetID="9" presetClass="entr" presetSubtype="0" fill="hold" nodeType="withEffect">
                                   <p:stCondLst>
                                     <p:cond delay="0"/>
                                   </p:stCondLst>
                                   <p:childTnLst>
                                     <p:set>
                                       <p:cBhvr>
-                                        <p:cTn id="27" dur="1" fill="hold">
+                                        <p:cTn id="31" dur="1" fill="hold">
                                           <p:stCondLst>
                                             <p:cond delay="0"/>
                                           </p:stCondLst>
@@ -8938,7 +8986,7 @@
                                     </p:set>
                                     <p:animEffect transition="in" filter="dissolve">
                                       <p:cBhvr>
-                                        <p:cTn id="28" dur="500"/>
+                                        <p:cTn id="32" dur="500"/>
                                         <p:tgtEl>
                                           <p:spTgt spid="37"/>
                                         </p:tgtEl>
@@ -8948,14 +8996,14 @@
                                 </p:cTn>
                               </p:par>
                               <p:par>
-                                <p:cTn id="29" presetID="3" presetClass="entr" presetSubtype="10" fill="hold" nodeType="withEffect">
+                                <p:cTn id="33" presetID="9" presetClass="entr" presetSubtype="0" fill="hold" nodeType="withEffect">
                                   <p:stCondLst>
                                     <p:cond delay="0"/>
                                   </p:stCondLst>
                                   <p:childTnLst>
                                     <p:set>
                                       <p:cBhvr>
-                                        <p:cTn id="30" dur="1" fill="hold">
+                                        <p:cTn id="34" dur="1" fill="hold">
                                           <p:stCondLst>
                                             <p:cond delay="0"/>
                                           </p:stCondLst>
@@ -8971,9 +9019,9 @@
                                         <p:strVal val="visible"/>
                                       </p:to>
                                     </p:set>
-                                    <p:animEffect transition="in" filter="blinds(horizontal)">
+                                    <p:animEffect transition="in" filter="dissolve">
                                       <p:cBhvr>
-                                        <p:cTn id="31" dur="500"/>
+                                        <p:cTn id="35" dur="500"/>
                                         <p:tgtEl>
                                           <p:spTgt spid="39"/>
                                         </p:tgtEl>
@@ -8983,14 +9031,49 @@
                                 </p:cTn>
                               </p:par>
                               <p:par>
-                                <p:cTn id="32" presetID="3" presetClass="entr" presetSubtype="10" fill="hold" nodeType="withEffect">
+                                <p:cTn id="36" presetID="9" presetClass="entr" presetSubtype="0" fill="hold" nodeType="withEffect">
                                   <p:stCondLst>
                                     <p:cond delay="0"/>
                                   </p:stCondLst>
                                   <p:childTnLst>
                                     <p:set>
                                       <p:cBhvr>
-                                        <p:cTn id="33" dur="1" fill="hold">
+                                        <p:cTn id="37" dur="1" fill="hold">
+                                          <p:stCondLst>
+                                            <p:cond delay="0"/>
+                                          </p:stCondLst>
+                                        </p:cTn>
+                                        <p:tgtEl>
+                                          <p:spTgt spid="45"/>
+                                        </p:tgtEl>
+                                        <p:attrNameLst>
+                                          <p:attrName>style.visibility</p:attrName>
+                                        </p:attrNameLst>
+                                      </p:cBhvr>
+                                      <p:to>
+                                        <p:strVal val="visible"/>
+                                      </p:to>
+                                    </p:set>
+                                    <p:animEffect transition="in" filter="dissolve">
+                                      <p:cBhvr>
+                                        <p:cTn id="38" dur="500"/>
+                                        <p:tgtEl>
+                                          <p:spTgt spid="45"/>
+                                        </p:tgtEl>
+                                      </p:cBhvr>
+                                    </p:animEffect>
+                                  </p:childTnLst>
+                                </p:cTn>
+                              </p:par>
+                              <p:par>
+                                <p:cTn id="39" presetID="9" presetClass="entr" presetSubtype="0" fill="hold" nodeType="withEffect">
+                                  <p:stCondLst>
+                                    <p:cond delay="0"/>
+                                  </p:stCondLst>
+                                  <p:childTnLst>
+                                    <p:set>
+                                      <p:cBhvr>
+                                        <p:cTn id="40" dur="1" fill="hold">
                                           <p:stCondLst>
                                             <p:cond delay="0"/>
                                           </p:stCondLst>
@@ -9006,46 +9089,11 @@
                                         <p:strVal val="visible"/>
                                       </p:to>
                                     </p:set>
-                                    <p:animEffect transition="in" filter="blinds(horizontal)">
+                                    <p:animEffect transition="in" filter="dissolve">
                                       <p:cBhvr>
-                                        <p:cTn id="34" dur="500"/>
+                                        <p:cTn id="41" dur="500"/>
                                         <p:tgtEl>
                                           <p:spTgt spid="41"/>
-                                        </p:tgtEl>
-                                      </p:cBhvr>
-                                    </p:animEffect>
-                                  </p:childTnLst>
-                                </p:cTn>
-                              </p:par>
-                              <p:par>
-                                <p:cTn id="35" presetID="3" presetClass="entr" presetSubtype="10" fill="hold" nodeType="withEffect">
-                                  <p:stCondLst>
-                                    <p:cond delay="0"/>
-                                  </p:stCondLst>
-                                  <p:childTnLst>
-                                    <p:set>
-                                      <p:cBhvr>
-                                        <p:cTn id="36" dur="1" fill="hold">
-                                          <p:stCondLst>
-                                            <p:cond delay="0"/>
-                                          </p:stCondLst>
-                                        </p:cTn>
-                                        <p:tgtEl>
-                                          <p:spTgt spid="45"/>
-                                        </p:tgtEl>
-                                        <p:attrNameLst>
-                                          <p:attrName>style.visibility</p:attrName>
-                                        </p:attrNameLst>
-                                      </p:cBhvr>
-                                      <p:to>
-                                        <p:strVal val="visible"/>
-                                      </p:to>
-                                    </p:set>
-                                    <p:animEffect transition="in" filter="blinds(horizontal)">
-                                      <p:cBhvr>
-                                        <p:cTn id="37" dur="500"/>
-                                        <p:tgtEl>
-                                          <p:spTgt spid="45"/>
                                         </p:tgtEl>
                                       </p:cBhvr>
                                     </p:animEffect>
@@ -9083,6 +9131,7 @@
       <p:bldP spid="21" grpId="0" animBg="1"/>
       <p:bldP spid="22" grpId="0" animBg="1"/>
       <p:bldP spid="23" grpId="0" animBg="1"/>
+      <p:bldP spid="25" grpId="0" animBg="1"/>
       <p:bldP spid="26" grpId="0" animBg="1"/>
       <p:bldP spid="31" grpId="0" animBg="1"/>
     </p:bldLst>
@@ -9391,13 +9440,668 @@
                   <a:schemeClr val="tx1"/>
                 </a:solidFill>
               </a:rPr>
-              <a:t>Model Improvements</a:t>
+              <a:t>Future Plans</a:t>
             </a:r>
             <a:endParaRPr lang="en-US" dirty="0">
               <a:solidFill>
                 <a:schemeClr val="tx1"/>
               </a:solidFill>
             </a:endParaRPr>
+          </a:p>
+        </p:txBody>
+      </p:sp>
+      <p:sp>
+        <p:nvSpPr>
+          <p:cNvPr id="5" name="Rounded Rectangle 4">
+            <a:extLst>
+              <a:ext uri="{FF2B5EF4-FFF2-40B4-BE49-F238E27FC236}">
+                <a16:creationId xmlns:a16="http://schemas.microsoft.com/office/drawing/2014/main" id="{E1A11EA7-B3FC-6F43-B29E-1B6BA46AA179}"/>
+              </a:ext>
+            </a:extLst>
+          </p:cNvPr>
+          <p:cNvSpPr/>
+          <p:nvPr/>
+        </p:nvSpPr>
+        <p:spPr>
+          <a:xfrm>
+            <a:off x="271470" y="657226"/>
+            <a:ext cx="3263830" cy="1768444"/>
+          </a:xfrm>
+          <a:prstGeom prst="roundRect">
+            <a:avLst/>
+          </a:prstGeom>
+          <a:solidFill>
+            <a:srgbClr val="00B0F0"/>
+          </a:solidFill>
+          <a:ln>
+            <a:noFill/>
+          </a:ln>
+        </p:spPr>
+        <p:style>
+          <a:lnRef idx="2">
+            <a:schemeClr val="accent1">
+              <a:shade val="50000"/>
+            </a:schemeClr>
+          </a:lnRef>
+          <a:fillRef idx="1">
+            <a:schemeClr val="accent1"/>
+          </a:fillRef>
+          <a:effectRef idx="0">
+            <a:schemeClr val="accent1"/>
+          </a:effectRef>
+          <a:fontRef idx="minor">
+            <a:schemeClr val="lt1"/>
+          </a:fontRef>
+        </p:style>
+        <p:txBody>
+          <a:bodyPr rtlCol="0" anchor="ctr"/>
+          <a:lstStyle/>
+          <a:p>
+            <a:pPr algn="ctr"/>
+            <a:endParaRPr lang="en-US" b="1" i="1" dirty="0"/>
+          </a:p>
+          <a:p>
+            <a:pPr algn="ctr"/>
+            <a:r>
+              <a:rPr lang="en-US" sz="1600" b="1" i="1" dirty="0"/>
+              <a:t>Play more with learning rate, momentum,</a:t>
+            </a:r>
+          </a:p>
+          <a:p>
+            <a:pPr algn="ctr"/>
+            <a:r>
+              <a:rPr lang="en-US" sz="1600" b="1" i="1" dirty="0"/>
+              <a:t>dropout rate and batch normalization</a:t>
+            </a:r>
+          </a:p>
+          <a:p>
+            <a:pPr algn="ctr"/>
+            <a:r>
+              <a:rPr lang="en-US" sz="1600" b="1" i="1" dirty="0"/>
+              <a:t>Increase image data base with time </a:t>
+            </a:r>
+          </a:p>
+          <a:p>
+            <a:pPr algn="ctr"/>
+            <a:endParaRPr lang="en-US" b="1" i="1" dirty="0"/>
+          </a:p>
+        </p:txBody>
+      </p:sp>
+      <p:sp>
+        <p:nvSpPr>
+          <p:cNvPr id="6" name="Right Arrow 5">
+            <a:extLst>
+              <a:ext uri="{FF2B5EF4-FFF2-40B4-BE49-F238E27FC236}">
+                <a16:creationId xmlns:a16="http://schemas.microsoft.com/office/drawing/2014/main" id="{68C832E2-1123-134D-A42B-C4D2997C5C16}"/>
+              </a:ext>
+            </a:extLst>
+          </p:cNvPr>
+          <p:cNvSpPr/>
+          <p:nvPr/>
+        </p:nvSpPr>
+        <p:spPr>
+          <a:xfrm>
+            <a:off x="3763622" y="1090978"/>
+            <a:ext cx="457200" cy="500062"/>
+          </a:xfrm>
+          <a:prstGeom prst="rightArrow">
+            <a:avLst/>
+          </a:prstGeom>
+          <a:solidFill>
+            <a:schemeClr val="accent5"/>
+          </a:solidFill>
+          <a:ln>
+            <a:noFill/>
+          </a:ln>
+        </p:spPr>
+        <p:style>
+          <a:lnRef idx="2">
+            <a:schemeClr val="accent1">
+              <a:shade val="50000"/>
+            </a:schemeClr>
+          </a:lnRef>
+          <a:fillRef idx="1">
+            <a:schemeClr val="accent1"/>
+          </a:fillRef>
+          <a:effectRef idx="0">
+            <a:schemeClr val="accent1"/>
+          </a:effectRef>
+          <a:fontRef idx="minor">
+            <a:schemeClr val="lt1"/>
+          </a:fontRef>
+        </p:style>
+        <p:txBody>
+          <a:bodyPr rtlCol="0" anchor="ctr"/>
+          <a:lstStyle/>
+          <a:p>
+            <a:pPr algn="ctr"/>
+            <a:endParaRPr lang="en-US"/>
+          </a:p>
+        </p:txBody>
+      </p:sp>
+      <p:sp>
+        <p:nvSpPr>
+          <p:cNvPr id="7" name="Rounded Rectangle 6">
+            <a:extLst>
+              <a:ext uri="{FF2B5EF4-FFF2-40B4-BE49-F238E27FC236}">
+                <a16:creationId xmlns:a16="http://schemas.microsoft.com/office/drawing/2014/main" id="{5E7CA846-5D8C-D842-B549-CF351E27A66B}"/>
+              </a:ext>
+            </a:extLst>
+          </p:cNvPr>
+          <p:cNvSpPr/>
+          <p:nvPr/>
+        </p:nvSpPr>
+        <p:spPr>
+          <a:xfrm>
+            <a:off x="4433031" y="528638"/>
+            <a:ext cx="3868007" cy="1223597"/>
+          </a:xfrm>
+          <a:prstGeom prst="roundRect">
+            <a:avLst/>
+          </a:prstGeom>
+          <a:solidFill>
+            <a:srgbClr val="00B0F0"/>
+          </a:solidFill>
+          <a:ln>
+            <a:noFill/>
+          </a:ln>
+        </p:spPr>
+        <p:style>
+          <a:lnRef idx="2">
+            <a:schemeClr val="accent1">
+              <a:shade val="50000"/>
+            </a:schemeClr>
+          </a:lnRef>
+          <a:fillRef idx="1">
+            <a:schemeClr val="accent1"/>
+          </a:fillRef>
+          <a:effectRef idx="0">
+            <a:schemeClr val="accent1"/>
+          </a:effectRef>
+          <a:fontRef idx="minor">
+            <a:schemeClr val="lt1"/>
+          </a:fontRef>
+        </p:style>
+        <p:txBody>
+          <a:bodyPr rtlCol="0" anchor="ctr"/>
+          <a:lstStyle/>
+          <a:p>
+            <a:pPr algn="ctr"/>
+            <a:endParaRPr lang="en-US" b="1" i="1" dirty="0"/>
+          </a:p>
+          <a:p>
+            <a:pPr algn="ctr"/>
+            <a:r>
+              <a:rPr lang="en-US" sz="1600" b="1" i="1" dirty="0"/>
+              <a:t>Unfreeze more model layers with more data</a:t>
+            </a:r>
+          </a:p>
+          <a:p>
+            <a:pPr algn="ctr"/>
+            <a:r>
+              <a:rPr lang="en-US" sz="1600" b="1" i="1" dirty="0"/>
+              <a:t>Create extra dense layers </a:t>
+            </a:r>
+          </a:p>
+          <a:p>
+            <a:pPr algn="ctr"/>
+            <a:r>
+              <a:rPr lang="en-US" sz="1600" b="1" i="1" dirty="0"/>
+              <a:t>Go from transfer learning to CNN </a:t>
+            </a:r>
+          </a:p>
+          <a:p>
+            <a:pPr algn="ctr"/>
+            <a:endParaRPr lang="en-US" b="1" i="1" dirty="0"/>
+          </a:p>
+        </p:txBody>
+      </p:sp>
+      <p:sp>
+        <p:nvSpPr>
+          <p:cNvPr id="8" name="Down Arrow 7">
+            <a:extLst>
+              <a:ext uri="{FF2B5EF4-FFF2-40B4-BE49-F238E27FC236}">
+                <a16:creationId xmlns:a16="http://schemas.microsoft.com/office/drawing/2014/main" id="{9C3C2237-04B5-B646-8A7A-346B1A3B3D90}"/>
+              </a:ext>
+            </a:extLst>
+          </p:cNvPr>
+          <p:cNvSpPr/>
+          <p:nvPr/>
+        </p:nvSpPr>
+        <p:spPr>
+          <a:xfrm>
+            <a:off x="5874622" y="1925824"/>
+            <a:ext cx="703384" cy="433754"/>
+          </a:xfrm>
+          <a:prstGeom prst="downArrow">
+            <a:avLst/>
+          </a:prstGeom>
+          <a:solidFill>
+            <a:schemeClr val="accent5"/>
+          </a:solidFill>
+          <a:ln>
+            <a:noFill/>
+          </a:ln>
+        </p:spPr>
+        <p:style>
+          <a:lnRef idx="2">
+            <a:schemeClr val="accent1">
+              <a:shade val="50000"/>
+            </a:schemeClr>
+          </a:lnRef>
+          <a:fillRef idx="1">
+            <a:schemeClr val="accent1"/>
+          </a:fillRef>
+          <a:effectRef idx="0">
+            <a:schemeClr val="accent1"/>
+          </a:effectRef>
+          <a:fontRef idx="minor">
+            <a:schemeClr val="lt1"/>
+          </a:fontRef>
+        </p:style>
+        <p:txBody>
+          <a:bodyPr rtlCol="0" anchor="ctr"/>
+          <a:lstStyle/>
+          <a:p>
+            <a:pPr algn="ctr"/>
+            <a:endParaRPr lang="en-US"/>
+          </a:p>
+        </p:txBody>
+      </p:sp>
+      <p:sp>
+        <p:nvSpPr>
+          <p:cNvPr id="9" name="Oval 8">
+            <a:extLst>
+              <a:ext uri="{FF2B5EF4-FFF2-40B4-BE49-F238E27FC236}">
+                <a16:creationId xmlns:a16="http://schemas.microsoft.com/office/drawing/2014/main" id="{8C14B5E0-6E2A-EB44-98FF-677FBA5FCF5F}"/>
+              </a:ext>
+            </a:extLst>
+          </p:cNvPr>
+          <p:cNvSpPr/>
+          <p:nvPr/>
+        </p:nvSpPr>
+        <p:spPr>
+          <a:xfrm>
+            <a:off x="4123283" y="2425668"/>
+            <a:ext cx="4820688" cy="842095"/>
+          </a:xfrm>
+          <a:prstGeom prst="ellipse">
+            <a:avLst/>
+          </a:prstGeom>
+          <a:solidFill>
+            <a:srgbClr val="00B0F0"/>
+          </a:solidFill>
+          <a:ln>
+            <a:noFill/>
+          </a:ln>
+        </p:spPr>
+        <p:style>
+          <a:lnRef idx="2">
+            <a:schemeClr val="accent1">
+              <a:shade val="50000"/>
+            </a:schemeClr>
+          </a:lnRef>
+          <a:fillRef idx="1">
+            <a:schemeClr val="accent1"/>
+          </a:fillRef>
+          <a:effectRef idx="0">
+            <a:schemeClr val="accent1"/>
+          </a:effectRef>
+          <a:fontRef idx="minor">
+            <a:schemeClr val="lt1"/>
+          </a:fontRef>
+        </p:style>
+        <p:txBody>
+          <a:bodyPr rtlCol="0" anchor="ctr"/>
+          <a:lstStyle/>
+          <a:p>
+            <a:pPr algn="ctr"/>
+            <a:endParaRPr lang="en-US" sz="1600" b="1" i="1" dirty="0"/>
+          </a:p>
+          <a:p>
+            <a:pPr algn="ctr"/>
+            <a:r>
+              <a:rPr lang="en-US" sz="1600" b="1" i="1" dirty="0"/>
+              <a:t>More complex accurate model to target more products</a:t>
+            </a:r>
+          </a:p>
+          <a:p>
+            <a:pPr algn="ctr"/>
+            <a:endParaRPr lang="en-US" sz="1600" b="1" i="1" dirty="0"/>
+          </a:p>
+        </p:txBody>
+      </p:sp>
+      <p:pic>
+        <p:nvPicPr>
+          <p:cNvPr id="10" name="Picture 9">
+            <a:extLst>
+              <a:ext uri="{FF2B5EF4-FFF2-40B4-BE49-F238E27FC236}">
+                <a16:creationId xmlns:a16="http://schemas.microsoft.com/office/drawing/2014/main" id="{4620EE23-B18D-CD4E-BEC3-95476B849FEA}"/>
+              </a:ext>
+            </a:extLst>
+          </p:cNvPr>
+          <p:cNvPicPr>
+            <a:picLocks noChangeAspect="1"/>
+          </p:cNvPicPr>
+          <p:nvPr/>
+        </p:nvPicPr>
+        <p:blipFill>
+          <a:blip r:embed="rId2"/>
+          <a:stretch>
+            <a:fillRect/>
+          </a:stretch>
+        </p:blipFill>
+        <p:spPr>
+          <a:xfrm>
+            <a:off x="7258819" y="3267763"/>
+            <a:ext cx="2062163" cy="2062163"/>
+          </a:xfrm>
+          <a:prstGeom prst="rect">
+            <a:avLst/>
+          </a:prstGeom>
+        </p:spPr>
+      </p:pic>
+      <p:grpSp>
+        <p:nvGrpSpPr>
+          <p:cNvPr id="27" name="Group 26">
+            <a:extLst>
+              <a:ext uri="{FF2B5EF4-FFF2-40B4-BE49-F238E27FC236}">
+                <a16:creationId xmlns:a16="http://schemas.microsoft.com/office/drawing/2014/main" id="{55BC6E06-2D3E-3B40-AAE2-6C83D5FF8818}"/>
+              </a:ext>
+            </a:extLst>
+          </p:cNvPr>
+          <p:cNvGrpSpPr/>
+          <p:nvPr/>
+        </p:nvGrpSpPr>
+        <p:grpSpPr>
+          <a:xfrm>
+            <a:off x="3673777" y="2219433"/>
+            <a:ext cx="456649" cy="433754"/>
+            <a:chOff x="2197420" y="4629150"/>
+            <a:chExt cx="832675" cy="823253"/>
+          </a:xfrm>
+        </p:grpSpPr>
+        <p:cxnSp>
+          <p:nvCxnSpPr>
+            <p:cNvPr id="13" name="Straight Connector 12">
+              <a:extLst>
+                <a:ext uri="{FF2B5EF4-FFF2-40B4-BE49-F238E27FC236}">
+                  <a16:creationId xmlns:a16="http://schemas.microsoft.com/office/drawing/2014/main" id="{86D03148-F2BB-E94B-AAD2-9BFDF67D2304}"/>
+                </a:ext>
+              </a:extLst>
+            </p:cNvPr>
+            <p:cNvCxnSpPr>
+              <a:cxnSpLocks/>
+            </p:cNvCxnSpPr>
+            <p:nvPr/>
+          </p:nvCxnSpPr>
+          <p:spPr>
+            <a:xfrm>
+              <a:off x="2197420" y="5004439"/>
+              <a:ext cx="832675" cy="0"/>
+            </a:xfrm>
+            <a:prstGeom prst="line">
+              <a:avLst/>
+            </a:prstGeom>
+            <a:ln w="203200">
+              <a:solidFill>
+                <a:schemeClr val="accent5"/>
+              </a:solidFill>
+            </a:ln>
+          </p:spPr>
+          <p:style>
+            <a:lnRef idx="1">
+              <a:schemeClr val="accent1"/>
+            </a:lnRef>
+            <a:fillRef idx="0">
+              <a:schemeClr val="accent1"/>
+            </a:fillRef>
+            <a:effectRef idx="0">
+              <a:schemeClr val="accent1"/>
+            </a:effectRef>
+            <a:fontRef idx="minor">
+              <a:schemeClr val="tx1"/>
+            </a:fontRef>
+          </p:style>
+        </p:cxnSp>
+        <p:cxnSp>
+          <p:nvCxnSpPr>
+            <p:cNvPr id="15" name="Straight Connector 14">
+              <a:extLst>
+                <a:ext uri="{FF2B5EF4-FFF2-40B4-BE49-F238E27FC236}">
+                  <a16:creationId xmlns:a16="http://schemas.microsoft.com/office/drawing/2014/main" id="{A251F4B2-7F92-774C-9DBF-1BB30CEFEEAA}"/>
+                </a:ext>
+              </a:extLst>
+            </p:cNvPr>
+            <p:cNvCxnSpPr>
+              <a:cxnSpLocks/>
+            </p:cNvCxnSpPr>
+            <p:nvPr/>
+          </p:nvCxnSpPr>
+          <p:spPr>
+            <a:xfrm>
+              <a:off x="2613758" y="4629150"/>
+              <a:ext cx="0" cy="823253"/>
+            </a:xfrm>
+            <a:prstGeom prst="line">
+              <a:avLst/>
+            </a:prstGeom>
+            <a:ln w="203200">
+              <a:solidFill>
+                <a:schemeClr val="accent5"/>
+              </a:solidFill>
+            </a:ln>
+          </p:spPr>
+          <p:style>
+            <a:lnRef idx="1">
+              <a:schemeClr val="accent1"/>
+            </a:lnRef>
+            <a:fillRef idx="0">
+              <a:schemeClr val="accent1"/>
+            </a:fillRef>
+            <a:effectRef idx="0">
+              <a:schemeClr val="accent1"/>
+            </a:effectRef>
+            <a:fontRef idx="minor">
+              <a:schemeClr val="tx1"/>
+            </a:fontRef>
+          </p:style>
+        </p:cxnSp>
+      </p:grpSp>
+      <p:sp>
+        <p:nvSpPr>
+          <p:cNvPr id="28" name="Rounded Rectangle 27">
+            <a:extLst>
+              <a:ext uri="{FF2B5EF4-FFF2-40B4-BE49-F238E27FC236}">
+                <a16:creationId xmlns:a16="http://schemas.microsoft.com/office/drawing/2014/main" id="{8EA32340-B5EF-E242-B2C8-B6B6A00C1A47}"/>
+              </a:ext>
+            </a:extLst>
+          </p:cNvPr>
+          <p:cNvSpPr/>
+          <p:nvPr/>
+        </p:nvSpPr>
+        <p:spPr>
+          <a:xfrm>
+            <a:off x="1185864" y="2659876"/>
+            <a:ext cx="2487914" cy="842094"/>
+          </a:xfrm>
+          <a:prstGeom prst="roundRect">
+            <a:avLst/>
+          </a:prstGeom>
+          <a:solidFill>
+            <a:srgbClr val="00B0F0"/>
+          </a:solidFill>
+          <a:ln>
+            <a:noFill/>
+          </a:ln>
+        </p:spPr>
+        <p:style>
+          <a:lnRef idx="2">
+            <a:schemeClr val="accent1">
+              <a:shade val="50000"/>
+            </a:schemeClr>
+          </a:lnRef>
+          <a:fillRef idx="1">
+            <a:schemeClr val="accent1"/>
+          </a:fillRef>
+          <a:effectRef idx="0">
+            <a:schemeClr val="accent1"/>
+          </a:effectRef>
+          <a:fontRef idx="minor">
+            <a:schemeClr val="lt1"/>
+          </a:fontRef>
+        </p:style>
+        <p:txBody>
+          <a:bodyPr rtlCol="0" anchor="ctr"/>
+          <a:lstStyle/>
+          <a:p>
+            <a:pPr algn="ctr"/>
+            <a:r>
+              <a:rPr lang="en-US" sz="1600" b="1" i="1" dirty="0"/>
+              <a:t>product and person identifier as a backend app</a:t>
+            </a:r>
+          </a:p>
+        </p:txBody>
+      </p:sp>
+      <p:sp>
+        <p:nvSpPr>
+          <p:cNvPr id="29" name="Rectangle 28">
+            <a:extLst>
+              <a:ext uri="{FF2B5EF4-FFF2-40B4-BE49-F238E27FC236}">
+                <a16:creationId xmlns:a16="http://schemas.microsoft.com/office/drawing/2014/main" id="{4D69C8AA-9C2D-9744-895C-6B467B4D7AF3}"/>
+              </a:ext>
+            </a:extLst>
+          </p:cNvPr>
+          <p:cNvSpPr/>
+          <p:nvPr/>
+        </p:nvSpPr>
+        <p:spPr>
+          <a:xfrm>
+            <a:off x="542947" y="3590238"/>
+            <a:ext cx="6367478" cy="3150740"/>
+          </a:xfrm>
+          <a:prstGeom prst="rect">
+            <a:avLst/>
+          </a:prstGeom>
+          <a:solidFill>
+            <a:srgbClr val="002060"/>
+          </a:solidFill>
+          <a:ln>
+            <a:noFill/>
+          </a:ln>
+        </p:spPr>
+        <p:style>
+          <a:lnRef idx="2">
+            <a:schemeClr val="accent1">
+              <a:shade val="50000"/>
+            </a:schemeClr>
+          </a:lnRef>
+          <a:fillRef idx="1">
+            <a:schemeClr val="accent1"/>
+          </a:fillRef>
+          <a:effectRef idx="0">
+            <a:schemeClr val="accent1"/>
+          </a:effectRef>
+          <a:fontRef idx="minor">
+            <a:schemeClr val="lt1"/>
+          </a:fontRef>
+        </p:style>
+        <p:txBody>
+          <a:bodyPr rtlCol="0" anchor="ctr"/>
+          <a:lstStyle/>
+          <a:p>
+            <a:pPr marL="285750" indent="-285750">
+              <a:buFont typeface="Wingdings" pitchFamily="2" charset="2"/>
+              <a:buChar char="Ø"/>
+            </a:pPr>
+            <a:endParaRPr lang="en-US" b="1" dirty="0"/>
+          </a:p>
+          <a:p>
+            <a:pPr marL="285750" indent="-285750">
+              <a:buFont typeface="Wingdings" pitchFamily="2" charset="2"/>
+              <a:buChar char="Ø"/>
+            </a:pPr>
+            <a:r>
+              <a:rPr lang="en-US" b="1" dirty="0"/>
+              <a:t>Advantages:</a:t>
+            </a:r>
+          </a:p>
+          <a:p>
+            <a:pPr marL="742950" lvl="1" indent="-285750">
+              <a:buFont typeface="Wingdings" pitchFamily="2" charset="2"/>
+              <a:buChar char="Ø"/>
+            </a:pPr>
+            <a:r>
+              <a:rPr lang="en-US" b="1" dirty="0"/>
+              <a:t>Less data memory intensive.</a:t>
+            </a:r>
+          </a:p>
+          <a:p>
+            <a:pPr marL="742950" lvl="1" indent="-285750">
+              <a:buFont typeface="Wingdings" pitchFamily="2" charset="2"/>
+              <a:buChar char="Ø"/>
+            </a:pPr>
+            <a:r>
+              <a:rPr lang="en-US" b="1" dirty="0"/>
+              <a:t>Automates marketing search via backend app:</a:t>
+            </a:r>
+          </a:p>
+          <a:p>
+            <a:pPr marL="1200150" lvl="2" indent="-285750">
+              <a:buFont typeface="Wingdings" pitchFamily="2" charset="2"/>
+              <a:buChar char="Ø"/>
+            </a:pPr>
+            <a:r>
+              <a:rPr lang="en-US" b="1" dirty="0"/>
+              <a:t>Less labor capital.</a:t>
+            </a:r>
+          </a:p>
+          <a:p>
+            <a:pPr marL="742950" lvl="1" indent="-285750">
+              <a:buFont typeface="Wingdings" pitchFamily="2" charset="2"/>
+              <a:buChar char="Ø"/>
+            </a:pPr>
+            <a:r>
+              <a:rPr lang="en-US" b="1" dirty="0"/>
+              <a:t>No need for cross site tracking:</a:t>
+            </a:r>
+          </a:p>
+          <a:p>
+            <a:pPr marL="1200150" lvl="2" indent="-285750">
+              <a:buFont typeface="Wingdings" pitchFamily="2" charset="2"/>
+              <a:buChar char="Ø"/>
+            </a:pPr>
+            <a:r>
+              <a:rPr lang="en-US" b="1" dirty="0"/>
+              <a:t>More security.</a:t>
+            </a:r>
+          </a:p>
+          <a:p>
+            <a:pPr marL="742950" lvl="1" indent="-285750">
+              <a:buFont typeface="Wingdings" pitchFamily="2" charset="2"/>
+              <a:buChar char="Ø"/>
+            </a:pPr>
+            <a:r>
+              <a:rPr lang="en-US" b="1" dirty="0"/>
+              <a:t>Identify potential customers without social media accounts.</a:t>
+            </a:r>
+          </a:p>
+          <a:p>
+            <a:pPr marL="742950" lvl="1" indent="-285750">
+              <a:buFont typeface="Wingdings" pitchFamily="2" charset="2"/>
+              <a:buChar char="Ø"/>
+            </a:pPr>
+            <a:r>
+              <a:rPr lang="en-US" b="1" dirty="0"/>
+              <a:t>Recommends products as both personal usage and gifts.</a:t>
+            </a:r>
+          </a:p>
+          <a:p>
+            <a:pPr marL="742950" lvl="1" indent="-285750">
+              <a:buFont typeface="Wingdings" pitchFamily="2" charset="2"/>
+              <a:buChar char="Ø"/>
+            </a:pPr>
+            <a:endParaRPr lang="en-US" dirty="0"/>
           </a:p>
         </p:txBody>
       </p:sp>
@@ -9411,6 +10115,340 @@
   <p:clrMapOvr>
     <a:masterClrMapping/>
   </p:clrMapOvr>
+  <p:timing>
+    <p:tnLst>
+      <p:par>
+        <p:cTn id="1" dur="indefinite" restart="never" nodeType="tmRoot">
+          <p:childTnLst>
+            <p:seq concurrent="1" nextAc="seek">
+              <p:cTn id="2" dur="indefinite" nodeType="mainSeq">
+                <p:childTnLst>
+                  <p:par>
+                    <p:cTn id="3" fill="hold">
+                      <p:stCondLst>
+                        <p:cond delay="indefinite"/>
+                      </p:stCondLst>
+                      <p:childTnLst>
+                        <p:par>
+                          <p:cTn id="4" fill="hold">
+                            <p:stCondLst>
+                              <p:cond delay="0"/>
+                            </p:stCondLst>
+                            <p:childTnLst>
+                              <p:par>
+                                <p:cTn id="5" presetID="1" presetClass="entr" presetSubtype="0" fill="hold" grpId="0" nodeType="clickEffect">
+                                  <p:stCondLst>
+                                    <p:cond delay="0"/>
+                                  </p:stCondLst>
+                                  <p:childTnLst>
+                                    <p:set>
+                                      <p:cBhvr>
+                                        <p:cTn id="6" dur="1" fill="hold">
+                                          <p:stCondLst>
+                                            <p:cond delay="0"/>
+                                          </p:stCondLst>
+                                        </p:cTn>
+                                        <p:tgtEl>
+                                          <p:spTgt spid="6"/>
+                                        </p:tgtEl>
+                                        <p:attrNameLst>
+                                          <p:attrName>style.visibility</p:attrName>
+                                        </p:attrNameLst>
+                                      </p:cBhvr>
+                                      <p:to>
+                                        <p:strVal val="visible"/>
+                                      </p:to>
+                                    </p:set>
+                                  </p:childTnLst>
+                                </p:cTn>
+                              </p:par>
+                              <p:par>
+                                <p:cTn id="7" presetID="1" presetClass="entr" presetSubtype="0" fill="hold" grpId="0" nodeType="withEffect">
+                                  <p:stCondLst>
+                                    <p:cond delay="0"/>
+                                  </p:stCondLst>
+                                  <p:childTnLst>
+                                    <p:set>
+                                      <p:cBhvr>
+                                        <p:cTn id="8" dur="1" fill="hold">
+                                          <p:stCondLst>
+                                            <p:cond delay="0"/>
+                                          </p:stCondLst>
+                                        </p:cTn>
+                                        <p:tgtEl>
+                                          <p:spTgt spid="7"/>
+                                        </p:tgtEl>
+                                        <p:attrNameLst>
+                                          <p:attrName>style.visibility</p:attrName>
+                                        </p:attrNameLst>
+                                      </p:cBhvr>
+                                      <p:to>
+                                        <p:strVal val="visible"/>
+                                      </p:to>
+                                    </p:set>
+                                  </p:childTnLst>
+                                </p:cTn>
+                              </p:par>
+                            </p:childTnLst>
+                          </p:cTn>
+                        </p:par>
+                      </p:childTnLst>
+                    </p:cTn>
+                  </p:par>
+                  <p:par>
+                    <p:cTn id="9" fill="hold">
+                      <p:stCondLst>
+                        <p:cond delay="indefinite"/>
+                      </p:stCondLst>
+                      <p:childTnLst>
+                        <p:par>
+                          <p:cTn id="10" fill="hold">
+                            <p:stCondLst>
+                              <p:cond delay="0"/>
+                            </p:stCondLst>
+                            <p:childTnLst>
+                              <p:par>
+                                <p:cTn id="11" presetID="1" presetClass="entr" presetSubtype="0" fill="hold" grpId="0" nodeType="clickEffect">
+                                  <p:stCondLst>
+                                    <p:cond delay="0"/>
+                                  </p:stCondLst>
+                                  <p:childTnLst>
+                                    <p:set>
+                                      <p:cBhvr>
+                                        <p:cTn id="12" dur="1" fill="hold">
+                                          <p:stCondLst>
+                                            <p:cond delay="0"/>
+                                          </p:stCondLst>
+                                        </p:cTn>
+                                        <p:tgtEl>
+                                          <p:spTgt spid="8"/>
+                                        </p:tgtEl>
+                                        <p:attrNameLst>
+                                          <p:attrName>style.visibility</p:attrName>
+                                        </p:attrNameLst>
+                                      </p:cBhvr>
+                                      <p:to>
+                                        <p:strVal val="visible"/>
+                                      </p:to>
+                                    </p:set>
+                                  </p:childTnLst>
+                                </p:cTn>
+                              </p:par>
+                              <p:par>
+                                <p:cTn id="13" presetID="1" presetClass="entr" presetSubtype="0" fill="hold" grpId="0" nodeType="withEffect">
+                                  <p:stCondLst>
+                                    <p:cond delay="0"/>
+                                  </p:stCondLst>
+                                  <p:childTnLst>
+                                    <p:set>
+                                      <p:cBhvr>
+                                        <p:cTn id="14" dur="1" fill="hold">
+                                          <p:stCondLst>
+                                            <p:cond delay="0"/>
+                                          </p:stCondLst>
+                                        </p:cTn>
+                                        <p:tgtEl>
+                                          <p:spTgt spid="9"/>
+                                        </p:tgtEl>
+                                        <p:attrNameLst>
+                                          <p:attrName>style.visibility</p:attrName>
+                                        </p:attrNameLst>
+                                      </p:cBhvr>
+                                      <p:to>
+                                        <p:strVal val="visible"/>
+                                      </p:to>
+                                    </p:set>
+                                  </p:childTnLst>
+                                </p:cTn>
+                              </p:par>
+                              <p:par>
+                                <p:cTn id="15" presetID="1" presetClass="entr" presetSubtype="0" fill="hold" nodeType="withEffect">
+                                  <p:stCondLst>
+                                    <p:cond delay="0"/>
+                                  </p:stCondLst>
+                                  <p:childTnLst>
+                                    <p:set>
+                                      <p:cBhvr>
+                                        <p:cTn id="16" dur="1" fill="hold">
+                                          <p:stCondLst>
+                                            <p:cond delay="0"/>
+                                          </p:stCondLst>
+                                        </p:cTn>
+                                        <p:tgtEl>
+                                          <p:spTgt spid="10"/>
+                                        </p:tgtEl>
+                                        <p:attrNameLst>
+                                          <p:attrName>style.visibility</p:attrName>
+                                        </p:attrNameLst>
+                                      </p:cBhvr>
+                                      <p:to>
+                                        <p:strVal val="visible"/>
+                                      </p:to>
+                                    </p:set>
+                                  </p:childTnLst>
+                                </p:cTn>
+                              </p:par>
+                            </p:childTnLst>
+                          </p:cTn>
+                        </p:par>
+                      </p:childTnLst>
+                    </p:cTn>
+                  </p:par>
+                  <p:par>
+                    <p:cTn id="17" fill="hold">
+                      <p:stCondLst>
+                        <p:cond delay="indefinite"/>
+                      </p:stCondLst>
+                      <p:childTnLst>
+                        <p:par>
+                          <p:cTn id="18" fill="hold">
+                            <p:stCondLst>
+                              <p:cond delay="0"/>
+                            </p:stCondLst>
+                            <p:childTnLst>
+                              <p:par>
+                                <p:cTn id="19" presetID="1" presetClass="entr" presetSubtype="0" fill="hold" nodeType="clickEffect">
+                                  <p:stCondLst>
+                                    <p:cond delay="0"/>
+                                  </p:stCondLst>
+                                  <p:childTnLst>
+                                    <p:set>
+                                      <p:cBhvr>
+                                        <p:cTn id="20" dur="1" fill="hold">
+                                          <p:stCondLst>
+                                            <p:cond delay="0"/>
+                                          </p:stCondLst>
+                                        </p:cTn>
+                                        <p:tgtEl>
+                                          <p:spTgt spid="27"/>
+                                        </p:tgtEl>
+                                        <p:attrNameLst>
+                                          <p:attrName>style.visibility</p:attrName>
+                                        </p:attrNameLst>
+                                      </p:cBhvr>
+                                      <p:to>
+                                        <p:strVal val="visible"/>
+                                      </p:to>
+                                    </p:set>
+                                  </p:childTnLst>
+                                </p:cTn>
+                              </p:par>
+                              <p:par>
+                                <p:cTn id="21" presetID="1" presetClass="entr" presetSubtype="0" fill="hold" grpId="0" nodeType="withEffect">
+                                  <p:stCondLst>
+                                    <p:cond delay="0"/>
+                                  </p:stCondLst>
+                                  <p:childTnLst>
+                                    <p:set>
+                                      <p:cBhvr>
+                                        <p:cTn id="22" dur="1" fill="hold">
+                                          <p:stCondLst>
+                                            <p:cond delay="0"/>
+                                          </p:stCondLst>
+                                        </p:cTn>
+                                        <p:tgtEl>
+                                          <p:spTgt spid="28"/>
+                                        </p:tgtEl>
+                                        <p:attrNameLst>
+                                          <p:attrName>style.visibility</p:attrName>
+                                        </p:attrNameLst>
+                                      </p:cBhvr>
+                                      <p:to>
+                                        <p:strVal val="visible"/>
+                                      </p:to>
+                                    </p:set>
+                                  </p:childTnLst>
+                                </p:cTn>
+                              </p:par>
+                            </p:childTnLst>
+                          </p:cTn>
+                        </p:par>
+                      </p:childTnLst>
+                    </p:cTn>
+                  </p:par>
+                  <p:par>
+                    <p:cTn id="23" fill="hold">
+                      <p:stCondLst>
+                        <p:cond delay="indefinite"/>
+                      </p:stCondLst>
+                      <p:childTnLst>
+                        <p:par>
+                          <p:cTn id="24" fill="hold">
+                            <p:stCondLst>
+                              <p:cond delay="0"/>
+                            </p:stCondLst>
+                            <p:childTnLst>
+                              <p:par>
+                                <p:cTn id="25" presetID="9" presetClass="entr" presetSubtype="0" fill="hold" grpId="0" nodeType="clickEffect">
+                                  <p:stCondLst>
+                                    <p:cond delay="0"/>
+                                  </p:stCondLst>
+                                  <p:childTnLst>
+                                    <p:set>
+                                      <p:cBhvr>
+                                        <p:cTn id="26" dur="1" fill="hold">
+                                          <p:stCondLst>
+                                            <p:cond delay="0"/>
+                                          </p:stCondLst>
+                                        </p:cTn>
+                                        <p:tgtEl>
+                                          <p:spTgt spid="29"/>
+                                        </p:tgtEl>
+                                        <p:attrNameLst>
+                                          <p:attrName>style.visibility</p:attrName>
+                                        </p:attrNameLst>
+                                      </p:cBhvr>
+                                      <p:to>
+                                        <p:strVal val="visible"/>
+                                      </p:to>
+                                    </p:set>
+                                    <p:animEffect transition="in" filter="dissolve">
+                                      <p:cBhvr>
+                                        <p:cTn id="27" dur="500"/>
+                                        <p:tgtEl>
+                                          <p:spTgt spid="29"/>
+                                        </p:tgtEl>
+                                      </p:cBhvr>
+                                    </p:animEffect>
+                                  </p:childTnLst>
+                                </p:cTn>
+                              </p:par>
+                            </p:childTnLst>
+                          </p:cTn>
+                        </p:par>
+                      </p:childTnLst>
+                    </p:cTn>
+                  </p:par>
+                </p:childTnLst>
+              </p:cTn>
+              <p:prevCondLst>
+                <p:cond evt="onPrev" delay="0">
+                  <p:tgtEl>
+                    <p:sldTgt/>
+                  </p:tgtEl>
+                </p:cond>
+              </p:prevCondLst>
+              <p:nextCondLst>
+                <p:cond evt="onNext" delay="0">
+                  <p:tgtEl>
+                    <p:sldTgt/>
+                  </p:tgtEl>
+                </p:cond>
+              </p:nextCondLst>
+            </p:seq>
+          </p:childTnLst>
+        </p:cTn>
+      </p:par>
+    </p:tnLst>
+    <p:bldLst>
+      <p:bldP spid="6" grpId="0" animBg="1"/>
+      <p:bldP spid="7" grpId="0" animBg="1"/>
+      <p:bldP spid="8" grpId="0" animBg="1"/>
+      <p:bldP spid="9" grpId="0" animBg="1"/>
+      <p:bldP spid="28" grpId="0" animBg="1"/>
+      <p:bldP spid="29" grpId="0" animBg="1"/>
+    </p:bldLst>
+  </p:timing>
 </p:sld>
 </file>
 
@@ -9477,6 +10515,388 @@
     <p:extLst>
       <p:ext uri="{BB962C8B-B14F-4D97-AF65-F5344CB8AC3E}">
         <p14:creationId xmlns:p14="http://schemas.microsoft.com/office/powerpoint/2010/main" val="776880058"/>
+      </p:ext>
+    </p:extLst>
+  </p:cSld>
+  <p:clrMapOvr>
+    <a:masterClrMapping/>
+  </p:clrMapOvr>
+</p:sld>
+</file>
+
+<file path=ppt/slides/slide7.xml><?xml version="1.0" encoding="utf-8"?>
+<p:sld xmlns:a="http://schemas.openxmlformats.org/drawingml/2006/main" xmlns:r="http://schemas.openxmlformats.org/officeDocument/2006/relationships" xmlns:p="http://schemas.openxmlformats.org/presentationml/2006/main">
+  <p:cSld>
+    <p:spTree>
+      <p:nvGrpSpPr>
+        <p:cNvPr id="1" name=""/>
+        <p:cNvGrpSpPr/>
+        <p:nvPr/>
+      </p:nvGrpSpPr>
+      <p:grpSpPr>
+        <a:xfrm>
+          <a:off x="0" y="0"/>
+          <a:ext cx="0" cy="0"/>
+          <a:chOff x="0" y="0"/>
+          <a:chExt cx="0" cy="0"/>
+        </a:xfrm>
+      </p:grpSpPr>
+      <p:sp>
+        <p:nvSpPr>
+          <p:cNvPr id="5" name="Title 1">
+            <a:extLst>
+              <a:ext uri="{FF2B5EF4-FFF2-40B4-BE49-F238E27FC236}">
+                <a16:creationId xmlns:a16="http://schemas.microsoft.com/office/drawing/2014/main" id="{E4BE6AD2-AB0A-E64D-BF75-993AAECE0CC4}"/>
+              </a:ext>
+            </a:extLst>
+          </p:cNvPr>
+          <p:cNvSpPr>
+            <a:spLocks noGrp="1"/>
+          </p:cNvSpPr>
+          <p:nvPr>
+            <p:ph type="title"/>
+          </p:nvPr>
+        </p:nvSpPr>
+        <p:spPr>
+          <a:xfrm>
+            <a:off x="3014664" y="3100387"/>
+            <a:ext cx="5772150" cy="657225"/>
+          </a:xfrm>
+        </p:spPr>
+        <p:txBody>
+          <a:bodyPr/>
+          <a:lstStyle/>
+          <a:p>
+            <a:pPr algn="ctr"/>
+            <a:r>
+              <a:rPr lang="en-US" b="1" i="1" dirty="0">
+                <a:solidFill>
+                  <a:schemeClr val="tx1"/>
+                </a:solidFill>
+              </a:rPr>
+              <a:t>Questions?</a:t>
+            </a:r>
+            <a:endParaRPr lang="en-US" dirty="0">
+              <a:solidFill>
+                <a:schemeClr val="tx1"/>
+              </a:solidFill>
+            </a:endParaRPr>
+          </a:p>
+        </p:txBody>
+      </p:sp>
+    </p:spTree>
+    <p:extLst>
+      <p:ext uri="{BB962C8B-B14F-4D97-AF65-F5344CB8AC3E}">
+        <p14:creationId xmlns:p14="http://schemas.microsoft.com/office/powerpoint/2010/main" val="2658304827"/>
+      </p:ext>
+    </p:extLst>
+  </p:cSld>
+  <p:clrMapOvr>
+    <a:masterClrMapping/>
+  </p:clrMapOvr>
+</p:sld>
+</file>
+
+<file path=ppt/slides/slide8.xml><?xml version="1.0" encoding="utf-8"?>
+<p:sld xmlns:a="http://schemas.openxmlformats.org/drawingml/2006/main" xmlns:r="http://schemas.openxmlformats.org/officeDocument/2006/relationships" xmlns:p="http://schemas.openxmlformats.org/presentationml/2006/main">
+  <p:cSld>
+    <p:spTree>
+      <p:nvGrpSpPr>
+        <p:cNvPr id="1" name=""/>
+        <p:cNvGrpSpPr/>
+        <p:nvPr/>
+      </p:nvGrpSpPr>
+      <p:grpSpPr>
+        <a:xfrm>
+          <a:off x="0" y="0"/>
+          <a:ext cx="0" cy="0"/>
+          <a:chOff x="0" y="0"/>
+          <a:chExt cx="0" cy="0"/>
+        </a:xfrm>
+      </p:grpSpPr>
+      <p:sp>
+        <p:nvSpPr>
+          <p:cNvPr id="3" name="Content Placeholder 2">
+            <a:extLst>
+              <a:ext uri="{FF2B5EF4-FFF2-40B4-BE49-F238E27FC236}">
+                <a16:creationId xmlns:a16="http://schemas.microsoft.com/office/drawing/2014/main" id="{4AD2A39C-F0CA-5F46-9D1C-EBF168F8A508}"/>
+              </a:ext>
+            </a:extLst>
+          </p:cNvPr>
+          <p:cNvSpPr>
+            <a:spLocks noGrp="1"/>
+          </p:cNvSpPr>
+          <p:nvPr>
+            <p:ph idx="1"/>
+          </p:nvPr>
+        </p:nvSpPr>
+        <p:spPr>
+          <a:xfrm>
+            <a:off x="591609" y="1260477"/>
+            <a:ext cx="8596668" cy="3880773"/>
+          </a:xfrm>
+        </p:spPr>
+        <p:txBody>
+          <a:bodyPr/>
+          <a:lstStyle/>
+          <a:p>
+            <a:r>
+              <a:rPr lang="en-US" dirty="0"/>
+              <a:t>Talented husband, Dr. Jason N. Dossett for setting up GPU and help with computer hardware. </a:t>
+            </a:r>
+          </a:p>
+          <a:p>
+            <a:r>
+              <a:rPr lang="en-US" dirty="0"/>
+              <a:t>Dr. Arun S. Maiya for forwarding helpful blog sources. </a:t>
+            </a:r>
+          </a:p>
+          <a:p>
+            <a:r>
+              <a:rPr lang="en-US" dirty="0"/>
+              <a:t>Flatiron instructors and coaches for discussing and providing helpful insights.</a:t>
+            </a:r>
+          </a:p>
+          <a:p>
+            <a:r>
+              <a:rPr lang="en-US" dirty="0"/>
+              <a:t>Wonderful students at Flatiron for being positive and encouraging. </a:t>
+            </a:r>
+          </a:p>
+          <a:p>
+            <a:endParaRPr lang="en-US" dirty="0"/>
+          </a:p>
+        </p:txBody>
+      </p:sp>
+      <p:sp>
+        <p:nvSpPr>
+          <p:cNvPr id="4" name="Title 1">
+            <a:extLst>
+              <a:ext uri="{FF2B5EF4-FFF2-40B4-BE49-F238E27FC236}">
+                <a16:creationId xmlns:a16="http://schemas.microsoft.com/office/drawing/2014/main" id="{80F13471-C81F-4D44-BE5E-7D85D9F535AF}"/>
+              </a:ext>
+            </a:extLst>
+          </p:cNvPr>
+          <p:cNvSpPr>
+            <a:spLocks noGrp="1"/>
+          </p:cNvSpPr>
+          <p:nvPr>
+            <p:ph type="title"/>
+          </p:nvPr>
+        </p:nvSpPr>
+        <p:spPr>
+          <a:xfrm>
+            <a:off x="0" y="0"/>
+            <a:ext cx="7243763" cy="657225"/>
+          </a:xfrm>
+        </p:spPr>
+        <p:txBody>
+          <a:bodyPr/>
+          <a:lstStyle/>
+          <a:p>
+            <a:r>
+              <a:rPr lang="en-US" b="1" i="1" dirty="0">
+                <a:solidFill>
+                  <a:schemeClr val="tx1"/>
+                </a:solidFill>
+              </a:rPr>
+              <a:t>Acknowledgements</a:t>
+            </a:r>
+            <a:endParaRPr lang="en-US" dirty="0">
+              <a:solidFill>
+                <a:schemeClr val="tx1"/>
+              </a:solidFill>
+            </a:endParaRPr>
+          </a:p>
+        </p:txBody>
+      </p:sp>
+    </p:spTree>
+    <p:extLst>
+      <p:ext uri="{BB962C8B-B14F-4D97-AF65-F5344CB8AC3E}">
+        <p14:creationId xmlns:p14="http://schemas.microsoft.com/office/powerpoint/2010/main" val="1188845395"/>
+      </p:ext>
+    </p:extLst>
+  </p:cSld>
+  <p:clrMapOvr>
+    <a:masterClrMapping/>
+  </p:clrMapOvr>
+</p:sld>
+</file>
+
+<file path=ppt/slides/slide9.xml><?xml version="1.0" encoding="utf-8"?>
+<p:sld xmlns:a="http://schemas.openxmlformats.org/drawingml/2006/main" xmlns:r="http://schemas.openxmlformats.org/officeDocument/2006/relationships" xmlns:p="http://schemas.openxmlformats.org/presentationml/2006/main">
+  <p:cSld>
+    <p:spTree>
+      <p:nvGrpSpPr>
+        <p:cNvPr id="1" name=""/>
+        <p:cNvGrpSpPr/>
+        <p:nvPr/>
+      </p:nvGrpSpPr>
+      <p:grpSpPr>
+        <a:xfrm>
+          <a:off x="0" y="0"/>
+          <a:ext cx="0" cy="0"/>
+          <a:chOff x="0" y="0"/>
+          <a:chExt cx="0" cy="0"/>
+        </a:xfrm>
+      </p:grpSpPr>
+      <p:sp>
+        <p:nvSpPr>
+          <p:cNvPr id="3" name="Content Placeholder 2">
+            <a:extLst>
+              <a:ext uri="{FF2B5EF4-FFF2-40B4-BE49-F238E27FC236}">
+                <a16:creationId xmlns:a16="http://schemas.microsoft.com/office/drawing/2014/main" id="{7FAF19D3-8008-134F-BA5C-F5AB64A467BC}"/>
+              </a:ext>
+            </a:extLst>
+          </p:cNvPr>
+          <p:cNvSpPr>
+            <a:spLocks noGrp="1"/>
+          </p:cNvSpPr>
+          <p:nvPr>
+            <p:ph idx="1"/>
+          </p:nvPr>
+        </p:nvSpPr>
+        <p:spPr>
+          <a:xfrm>
+            <a:off x="220134" y="903289"/>
+            <a:ext cx="8596668" cy="5954711"/>
+          </a:xfrm>
+        </p:spPr>
+        <p:txBody>
+          <a:bodyPr/>
+          <a:lstStyle/>
+          <a:p>
+            <a:r>
+              <a:rPr lang="en-US" dirty="0">
+                <a:hlinkClick r:id="rId2"/>
+              </a:rPr>
+              <a:t>https://www.pyimagesearch.com/2017/12/04/how-to-create-a-deep-learning-dataset-using-google-images/</a:t>
+            </a:r>
+            <a:endParaRPr lang="en-US" dirty="0"/>
+          </a:p>
+          <a:p>
+            <a:r>
+              <a:rPr lang="en-US" dirty="0">
+                <a:hlinkClick r:id="rId3"/>
+              </a:rPr>
+              <a:t>https://blog.keras.io/building-powerful-image-classification-models-using-very-little-data.html</a:t>
+            </a:r>
+            <a:endParaRPr lang="en-US" dirty="0"/>
+          </a:p>
+          <a:p>
+            <a:r>
+              <a:rPr lang="en-US" dirty="0">
+                <a:hlinkClick r:id="rId4"/>
+              </a:rPr>
+              <a:t>https://machinelearningmastery.com/check-point-deep-learning-models-keras/</a:t>
+            </a:r>
+            <a:endParaRPr lang="en-US" dirty="0"/>
+          </a:p>
+          <a:p>
+            <a:r>
+              <a:rPr lang="en-US" dirty="0">
+                <a:hlinkClick r:id="rId5"/>
+              </a:rPr>
+              <a:t>https://machinelearningmastery.com/save-load-keras-deep-learning-models/</a:t>
+            </a:r>
+            <a:endParaRPr lang="en-US" dirty="0"/>
+          </a:p>
+          <a:p>
+            <a:r>
+              <a:rPr lang="en-US" dirty="0">
+                <a:hlinkClick r:id="rId6"/>
+              </a:rPr>
+              <a:t>https://medium.com/@sidereal/cnns-architectures-lenet-alexnet-vgg-googlenet-resnet-and-more-666091488df5</a:t>
+            </a:r>
+            <a:endParaRPr lang="en-US" dirty="0"/>
+          </a:p>
+          <a:p>
+            <a:r>
+              <a:rPr lang="en-US" dirty="0">
+                <a:hlinkClick r:id="rId7"/>
+              </a:rPr>
+              <a:t>https://towardsdatascience.com/understanding-and-coding-a-resnet-in-keras-446d7ff84d33</a:t>
+            </a:r>
+            <a:endParaRPr lang="en-US" dirty="0"/>
+          </a:p>
+          <a:p>
+            <a:r>
+              <a:rPr lang="en-US" dirty="0">
+                <a:hlinkClick r:id="rId8"/>
+              </a:rPr>
+              <a:t>https://www.kaggle.com/suniliitb96/tutorial-keras-transfer-learning-with-resnet50</a:t>
+            </a:r>
+            <a:endParaRPr lang="en-US" dirty="0"/>
+          </a:p>
+          <a:p>
+            <a:r>
+              <a:rPr lang="en-US" dirty="0">
+                <a:hlinkClick r:id="rId9"/>
+              </a:rPr>
+              <a:t>https://www.kaggle.com/pmigdal/transfer-learning-with-resnet-50-in-keras</a:t>
+            </a:r>
+            <a:endParaRPr lang="en-US" dirty="0"/>
+          </a:p>
+          <a:p>
+            <a:r>
+              <a:rPr lang="en-US" dirty="0">
+                <a:hlinkClick r:id="rId10"/>
+              </a:rPr>
+              <a:t>https://towardsdatascience.com/transfer-learning-for-image-classification-using-keras-c47ccf09c8c8</a:t>
+            </a:r>
+            <a:endParaRPr lang="en-US" dirty="0"/>
+          </a:p>
+          <a:p>
+            <a:endParaRPr lang="en-US" dirty="0"/>
+          </a:p>
+        </p:txBody>
+      </p:sp>
+      <p:sp>
+        <p:nvSpPr>
+          <p:cNvPr id="5" name="Title 1">
+            <a:extLst>
+              <a:ext uri="{FF2B5EF4-FFF2-40B4-BE49-F238E27FC236}">
+                <a16:creationId xmlns:a16="http://schemas.microsoft.com/office/drawing/2014/main" id="{B6D1E172-9356-2244-9725-E07A053D0F00}"/>
+              </a:ext>
+            </a:extLst>
+          </p:cNvPr>
+          <p:cNvSpPr>
+            <a:spLocks noGrp="1"/>
+          </p:cNvSpPr>
+          <p:nvPr>
+            <p:ph type="title"/>
+          </p:nvPr>
+        </p:nvSpPr>
+        <p:spPr>
+          <a:xfrm>
+            <a:off x="0" y="0"/>
+            <a:ext cx="7243763" cy="657225"/>
+          </a:xfrm>
+        </p:spPr>
+        <p:txBody>
+          <a:bodyPr/>
+          <a:lstStyle/>
+          <a:p>
+            <a:r>
+              <a:rPr lang="en-US" b="1" i="1" dirty="0">
+                <a:solidFill>
+                  <a:schemeClr val="tx1"/>
+                </a:solidFill>
+              </a:rPr>
+              <a:t>Sources:</a:t>
+            </a:r>
+            <a:endParaRPr lang="en-US" dirty="0">
+              <a:solidFill>
+                <a:schemeClr val="tx1"/>
+              </a:solidFill>
+            </a:endParaRPr>
+          </a:p>
+        </p:txBody>
+      </p:sp>
+    </p:spTree>
+    <p:extLst>
+      <p:ext uri="{BB962C8B-B14F-4D97-AF65-F5344CB8AC3E}">
+        <p14:creationId xmlns:p14="http://schemas.microsoft.com/office/powerpoint/2010/main" val="4201160355"/>
       </p:ext>
     </p:extLst>
   </p:cSld>

</xml_diff>